<commit_message>
Add specific branch to DevStack cloning command
</commit_message>
<xml_diff>
--- a/OpenStackProject/98-99_01_CloudComputing_ProjectLecture1.pptx
+++ b/OpenStackProject/98-99_01_CloudComputing_ProjectLecture1.pptx
@@ -137,7 +137,7 @@
       </a:defRPr>
     </a:lvl9pPr>
   </p:defaultTextStyle>
-  <p:modifyVerifier cryptProviderType="rsaAES" cryptAlgorithmClass="hash" cryptAlgorithmType="typeAny" cryptAlgorithmSid="14" spinCount="100000" saltData="jfFDPRFwkmTgN9+ZktsscA==" hashData="hgLq9Ss5SVvIWCZsiCpr5RLWF4CPbVblFT9Le4AnHJY4jeZaWS3xt3+FYwRYwarihNZ2oGAxMBdsDwwvnsO+Mw=="/>
+  <p:modifyVerifier cryptProviderType="rsaAES" cryptAlgorithmClass="hash" cryptAlgorithmType="typeAny" cryptAlgorithmSid="14" spinCount="100000" saltData="6ZwP76UHy54/Wy4+edUrvg==" hashData="S2BeAU76hqPyjD3bF6vJxzWq7X4rCaNN3AhuQgiWPpJAQxRFh1QXCPCuLYkd0PRHuYCsrmGLfYtxdxJkCLWflA=="/>
   <p:extLst>
     <p:ext uri="{EFAFB233-063F-42B5-8137-9DF3F51BA10A}">
       <p15:sldGuideLst xmlns:p15="http://schemas.microsoft.com/office/powerpoint/2012/main">
@@ -242,7 +242,7 @@
           <a:p>
             <a:fld id="{41658A34-83F4-4B2E-BC5A-DE51EE8822F9}" type="datetimeFigureOut">
               <a:rPr lang="en-US" smtClean="0"/>
-              <a:t>2019-10-09</a:t>
+              <a:t>2019-10-15</a:t>
             </a:fld>
             <a:endParaRPr lang="en-US"/>
           </a:p>
@@ -407,7 +407,7 @@
           <a:p>
             <a:fld id="{7F2E1917-0BAF-4687-978A-82FFF05559C3}" type="datetimeFigureOut">
               <a:rPr lang="en-US" smtClean="0"/>
-              <a:t>2019-10-09</a:t>
+              <a:t>2019-10-15</a:t>
             </a:fld>
             <a:endParaRPr lang="en-US"/>
           </a:p>
@@ -7589,13 +7589,13 @@
   <p:clrMapOvr>
     <a:masterClrMapping/>
   </p:clrMapOvr>
-  <mc:AlternateContent xmlns:mc="http://schemas.openxmlformats.org/markup-compatibility/2006">
-    <mc:Choice xmlns:p14="http://schemas.microsoft.com/office/powerpoint/2010/main" Requires="p14">
+  <mc:AlternateContent xmlns:mc="http://schemas.openxmlformats.org/markup-compatibility/2006" xmlns:p14="http://schemas.microsoft.com/office/powerpoint/2010/main">
+    <mc:Choice Requires="p14">
       <p:transition spd="med" p14:dur="700">
         <p:fade/>
       </p:transition>
     </mc:Choice>
-    <mc:Fallback>
+    <mc:Fallback xmlns="">
       <p:transition spd="med">
         <p:fade/>
       </p:transition>
@@ -8805,7 +8805,32 @@
                 </a:solidFill>
                 <a:latin typeface="Menlo"/>
               </a:rPr>
-              <a:t>git clone https://github.com/openstack/devstack.git</a:t>
+              <a:t>git clone </a:t>
+            </a:r>
+            <a:r>
+              <a:rPr lang="en-US" altLang="en-US" sz="2000" dirty="0">
+                <a:solidFill>
+                  <a:schemeClr val="bg1"/>
+                </a:solidFill>
+                <a:latin typeface="Menlo"/>
+                <a:hlinkClick r:id="rId3">
+                  <a:extLst>
+                    <a:ext uri="{A12FA001-AC4F-418D-AE19-62706E023703}">
+                      <ahyp:hlinkClr xmlns:ahyp="http://schemas.microsoft.com/office/drawing/2018/hyperlinkcolor" val="tx"/>
+                    </a:ext>
+                  </a:extLst>
+                </a:hlinkClick>
+              </a:rPr>
+              <a:t>https://github.com/openstack/devstack.git</a:t>
+            </a:r>
+            <a:r>
+              <a:rPr lang="en-US" altLang="en-US" sz="2000" dirty="0">
+                <a:solidFill>
+                  <a:srgbClr val="FFFFFF"/>
+                </a:solidFill>
+                <a:latin typeface="Menlo"/>
+              </a:rPr>
+              <a:t> -b stable/stein</a:t>
             </a:r>
           </a:p>
           <a:p>
@@ -11042,13 +11067,13 @@
   <p:clrMapOvr>
     <a:masterClrMapping/>
   </p:clrMapOvr>
-  <mc:AlternateContent xmlns:mc="http://schemas.openxmlformats.org/markup-compatibility/2006">
-    <mc:Choice xmlns:p14="http://schemas.microsoft.com/office/powerpoint/2010/main" Requires="p14">
+  <mc:AlternateContent xmlns:mc="http://schemas.openxmlformats.org/markup-compatibility/2006" xmlns:p14="http://schemas.microsoft.com/office/powerpoint/2010/main">
+    <mc:Choice Requires="p14">
       <p:transition spd="med" p14:dur="700">
         <p:fade/>
       </p:transition>
     </mc:Choice>
-    <mc:Fallback>
+    <mc:Fallback xmlns="">
       <p:transition spd="med">
         <p:fade/>
       </p:transition>
@@ -11241,13 +11266,13 @@
   <p:clrMapOvr>
     <a:masterClrMapping/>
   </p:clrMapOvr>
-  <mc:AlternateContent xmlns:mc="http://schemas.openxmlformats.org/markup-compatibility/2006">
-    <mc:Choice xmlns:p14="http://schemas.microsoft.com/office/powerpoint/2010/main" Requires="p14">
+  <mc:AlternateContent xmlns:mc="http://schemas.openxmlformats.org/markup-compatibility/2006" xmlns:p14="http://schemas.microsoft.com/office/powerpoint/2010/main">
+    <mc:Choice Requires="p14">
       <p:transition spd="med" p14:dur="700">
         <p:fade/>
       </p:transition>
     </mc:Choice>
-    <mc:Fallback>
+    <mc:Fallback xmlns="">
       <p:transition spd="med">
         <p:fade/>
       </p:transition>

</xml_diff>